<commit_message>
Atualizações na Interface Picket Fence
</commit_message>
<xml_diff>
--- a/Itens da interface.pptx
+++ b/Itens da interface.pptx
@@ -261,7 +261,7 @@
           <a:p>
             <a:fld id="{955F0460-C245-41DB-BE97-60573FC2C393}" type="datetimeFigureOut">
               <a:rPr lang="pt-BR" smtClean="0"/>
-              <a:t>14/07/2020</a:t>
+              <a:t>16/07/2020</a:t>
             </a:fld>
             <a:endParaRPr lang="pt-BR"/>
           </a:p>
@@ -459,7 +459,7 @@
           <a:p>
             <a:fld id="{955F0460-C245-41DB-BE97-60573FC2C393}" type="datetimeFigureOut">
               <a:rPr lang="pt-BR" smtClean="0"/>
-              <a:t>14/07/2020</a:t>
+              <a:t>16/07/2020</a:t>
             </a:fld>
             <a:endParaRPr lang="pt-BR"/>
           </a:p>
@@ -667,7 +667,7 @@
           <a:p>
             <a:fld id="{955F0460-C245-41DB-BE97-60573FC2C393}" type="datetimeFigureOut">
               <a:rPr lang="pt-BR" smtClean="0"/>
-              <a:t>14/07/2020</a:t>
+              <a:t>16/07/2020</a:t>
             </a:fld>
             <a:endParaRPr lang="pt-BR"/>
           </a:p>
@@ -865,7 +865,7 @@
           <a:p>
             <a:fld id="{955F0460-C245-41DB-BE97-60573FC2C393}" type="datetimeFigureOut">
               <a:rPr lang="pt-BR" smtClean="0"/>
-              <a:t>14/07/2020</a:t>
+              <a:t>16/07/2020</a:t>
             </a:fld>
             <a:endParaRPr lang="pt-BR"/>
           </a:p>
@@ -1140,7 +1140,7 @@
           <a:p>
             <a:fld id="{955F0460-C245-41DB-BE97-60573FC2C393}" type="datetimeFigureOut">
               <a:rPr lang="pt-BR" smtClean="0"/>
-              <a:t>14/07/2020</a:t>
+              <a:t>16/07/2020</a:t>
             </a:fld>
             <a:endParaRPr lang="pt-BR"/>
           </a:p>
@@ -1405,7 +1405,7 @@
           <a:p>
             <a:fld id="{955F0460-C245-41DB-BE97-60573FC2C393}" type="datetimeFigureOut">
               <a:rPr lang="pt-BR" smtClean="0"/>
-              <a:t>14/07/2020</a:t>
+              <a:t>16/07/2020</a:t>
             </a:fld>
             <a:endParaRPr lang="pt-BR"/>
           </a:p>
@@ -1817,7 +1817,7 @@
           <a:p>
             <a:fld id="{955F0460-C245-41DB-BE97-60573FC2C393}" type="datetimeFigureOut">
               <a:rPr lang="pt-BR" smtClean="0"/>
-              <a:t>14/07/2020</a:t>
+              <a:t>16/07/2020</a:t>
             </a:fld>
             <a:endParaRPr lang="pt-BR"/>
           </a:p>
@@ -1958,7 +1958,7 @@
           <a:p>
             <a:fld id="{955F0460-C245-41DB-BE97-60573FC2C393}" type="datetimeFigureOut">
               <a:rPr lang="pt-BR" smtClean="0"/>
-              <a:t>14/07/2020</a:t>
+              <a:t>16/07/2020</a:t>
             </a:fld>
             <a:endParaRPr lang="pt-BR"/>
           </a:p>
@@ -2071,7 +2071,7 @@
           <a:p>
             <a:fld id="{955F0460-C245-41DB-BE97-60573FC2C393}" type="datetimeFigureOut">
               <a:rPr lang="pt-BR" smtClean="0"/>
-              <a:t>14/07/2020</a:t>
+              <a:t>16/07/2020</a:t>
             </a:fld>
             <a:endParaRPr lang="pt-BR"/>
           </a:p>
@@ -2382,7 +2382,7 @@
           <a:p>
             <a:fld id="{955F0460-C245-41DB-BE97-60573FC2C393}" type="datetimeFigureOut">
               <a:rPr lang="pt-BR" smtClean="0"/>
-              <a:t>14/07/2020</a:t>
+              <a:t>16/07/2020</a:t>
             </a:fld>
             <a:endParaRPr lang="pt-BR"/>
           </a:p>
@@ -2670,7 +2670,7 @@
           <a:p>
             <a:fld id="{955F0460-C245-41DB-BE97-60573FC2C393}" type="datetimeFigureOut">
               <a:rPr lang="pt-BR" smtClean="0"/>
-              <a:t>14/07/2020</a:t>
+              <a:t>16/07/2020</a:t>
             </a:fld>
             <a:endParaRPr lang="pt-BR"/>
           </a:p>
@@ -2911,7 +2911,7 @@
           <a:p>
             <a:fld id="{955F0460-C245-41DB-BE97-60573FC2C393}" type="datetimeFigureOut">
               <a:rPr lang="pt-BR" smtClean="0"/>
-              <a:t>14/07/2020</a:t>
+              <a:t>16/07/2020</a:t>
             </a:fld>
             <a:endParaRPr lang="pt-BR"/>
           </a:p>
@@ -3585,7 +3585,7 @@
         <p:spPr>
           <a:xfrm>
             <a:off x="3003613" y="4317253"/>
-            <a:ext cx="3957960" cy="2031325"/>
+            <a:ext cx="3957960" cy="1477328"/>
           </a:xfrm>
           <a:prstGeom prst="rect">
             <a:avLst/>
@@ -3614,7 +3614,7 @@
             </a:pPr>
             <a:r>
               <a:rPr lang="pt-BR" dirty="0"/>
-              <a:t>Editar informações da imagem</a:t>
+              <a:t>Ajuda</a:t>
             </a:r>
           </a:p>
           <a:p>
@@ -3624,17 +3624,7 @@
             </a:pPr>
             <a:r>
               <a:rPr lang="pt-BR" dirty="0"/>
-              <a:t>Critérios de análise</a:t>
-            </a:r>
-          </a:p>
-          <a:p>
-            <a:pPr marL="857250" lvl="1" indent="-400050">
-              <a:buFont typeface="+mj-lt"/>
-              <a:buAutoNum type="romanLcPeriod"/>
-            </a:pPr>
-            <a:r>
-              <a:rPr lang="pt-BR" dirty="0"/>
-              <a:t>Opções de exibição do resultado</a:t>
+              <a:t>Sobre o programa</a:t>
             </a:r>
           </a:p>
           <a:p>
@@ -4474,7 +4464,7 @@
             <a:pPr algn="ctr"/>
             <a:r>
               <a:rPr lang="pt-BR" dirty="0"/>
-              <a:t>BOTÃO AVANÇAR</a:t>
+              <a:t>BOTÕES</a:t>
             </a:r>
           </a:p>
         </p:txBody>

</xml_diff>